<commit_message>
start of cfa, index up. pca helper
</commit_message>
<xml_diff>
--- a/msmr_labs/images/efa_output.pptx
+++ b/msmr_labs/images/efa_output.pptx
@@ -18,6 +18,7 @@
     <p:sldId id="271" r:id="rId12"/>
     <p:sldId id="273" r:id="rId13"/>
     <p:sldId id="274" r:id="rId14"/>
+    <p:sldId id="275" r:id="rId15"/>
   </p:sldIdLst>
   <p:sldSz cx="12192000" cy="6858000"/>
   <p:notesSz cx="6858000" cy="9144000"/>
@@ -273,7 +274,7 @@
           <a:p>
             <a:fld id="{2E7CC89D-3142-46AB-8DEE-A39EF376CEDE}" type="datetimeFigureOut">
               <a:rPr lang="en-GB" smtClean="0"/>
-              <a:t>22/02/2024</a:t>
+              <a:t>26/02/2024</a:t>
             </a:fld>
             <a:endParaRPr lang="en-GB"/>
           </a:p>
@@ -473,7 +474,7 @@
           <a:p>
             <a:fld id="{2E7CC89D-3142-46AB-8DEE-A39EF376CEDE}" type="datetimeFigureOut">
               <a:rPr lang="en-GB" smtClean="0"/>
-              <a:t>22/02/2024</a:t>
+              <a:t>26/02/2024</a:t>
             </a:fld>
             <a:endParaRPr lang="en-GB"/>
           </a:p>
@@ -683,7 +684,7 @@
           <a:p>
             <a:fld id="{2E7CC89D-3142-46AB-8DEE-A39EF376CEDE}" type="datetimeFigureOut">
               <a:rPr lang="en-GB" smtClean="0"/>
-              <a:t>22/02/2024</a:t>
+              <a:t>26/02/2024</a:t>
             </a:fld>
             <a:endParaRPr lang="en-GB"/>
           </a:p>
@@ -883,7 +884,7 @@
           <a:p>
             <a:fld id="{2E7CC89D-3142-46AB-8DEE-A39EF376CEDE}" type="datetimeFigureOut">
               <a:rPr lang="en-GB" smtClean="0"/>
-              <a:t>22/02/2024</a:t>
+              <a:t>26/02/2024</a:t>
             </a:fld>
             <a:endParaRPr lang="en-GB"/>
           </a:p>
@@ -1159,7 +1160,7 @@
           <a:p>
             <a:fld id="{2E7CC89D-3142-46AB-8DEE-A39EF376CEDE}" type="datetimeFigureOut">
               <a:rPr lang="en-GB" smtClean="0"/>
-              <a:t>22/02/2024</a:t>
+              <a:t>26/02/2024</a:t>
             </a:fld>
             <a:endParaRPr lang="en-GB"/>
           </a:p>
@@ -1427,7 +1428,7 @@
           <a:p>
             <a:fld id="{2E7CC89D-3142-46AB-8DEE-A39EF376CEDE}" type="datetimeFigureOut">
               <a:rPr lang="en-GB" smtClean="0"/>
-              <a:t>22/02/2024</a:t>
+              <a:t>26/02/2024</a:t>
             </a:fld>
             <a:endParaRPr lang="en-GB"/>
           </a:p>
@@ -1842,7 +1843,7 @@
           <a:p>
             <a:fld id="{2E7CC89D-3142-46AB-8DEE-A39EF376CEDE}" type="datetimeFigureOut">
               <a:rPr lang="en-GB" smtClean="0"/>
-              <a:t>22/02/2024</a:t>
+              <a:t>26/02/2024</a:t>
             </a:fld>
             <a:endParaRPr lang="en-GB"/>
           </a:p>
@@ -1984,7 +1985,7 @@
           <a:p>
             <a:fld id="{2E7CC89D-3142-46AB-8DEE-A39EF376CEDE}" type="datetimeFigureOut">
               <a:rPr lang="en-GB" smtClean="0"/>
-              <a:t>22/02/2024</a:t>
+              <a:t>26/02/2024</a:t>
             </a:fld>
             <a:endParaRPr lang="en-GB"/>
           </a:p>
@@ -2097,7 +2098,7 @@
           <a:p>
             <a:fld id="{2E7CC89D-3142-46AB-8DEE-A39EF376CEDE}" type="datetimeFigureOut">
               <a:rPr lang="en-GB" smtClean="0"/>
-              <a:t>22/02/2024</a:t>
+              <a:t>26/02/2024</a:t>
             </a:fld>
             <a:endParaRPr lang="en-GB"/>
           </a:p>
@@ -2410,7 +2411,7 @@
           <a:p>
             <a:fld id="{2E7CC89D-3142-46AB-8DEE-A39EF376CEDE}" type="datetimeFigureOut">
               <a:rPr lang="en-GB" smtClean="0"/>
-              <a:t>22/02/2024</a:t>
+              <a:t>26/02/2024</a:t>
             </a:fld>
             <a:endParaRPr lang="en-GB"/>
           </a:p>
@@ -2699,7 +2700,7 @@
           <a:p>
             <a:fld id="{2E7CC89D-3142-46AB-8DEE-A39EF376CEDE}" type="datetimeFigureOut">
               <a:rPr lang="en-GB" smtClean="0"/>
-              <a:t>22/02/2024</a:t>
+              <a:t>26/02/2024</a:t>
             </a:fld>
             <a:endParaRPr lang="en-GB"/>
           </a:p>
@@ -2942,7 +2943,7 @@
           <a:p>
             <a:fld id="{2E7CC89D-3142-46AB-8DEE-A39EF376CEDE}" type="datetimeFigureOut">
               <a:rPr lang="en-GB" smtClean="0"/>
-              <a:t>22/02/2024</a:t>
+              <a:t>26/02/2024</a:t>
             </a:fld>
             <a:endParaRPr lang="en-GB"/>
           </a:p>
@@ -6415,6 +6416,463 @@
 </p:sld>
 </file>
 
+<file path=ppt/slides/slide14.xml><?xml version="1.0" encoding="utf-8"?>
+<p:sld xmlns:a="http://schemas.openxmlformats.org/drawingml/2006/main" xmlns:r="http://schemas.openxmlformats.org/officeDocument/2006/relationships" xmlns:p="http://schemas.openxmlformats.org/presentationml/2006/main">
+  <p:cSld>
+    <p:spTree>
+      <p:nvGrpSpPr>
+        <p:cNvPr id="1" name=""/>
+        <p:cNvGrpSpPr/>
+        <p:nvPr/>
+      </p:nvGrpSpPr>
+      <p:grpSpPr>
+        <a:xfrm>
+          <a:off x="0" y="0"/>
+          <a:ext cx="0" cy="0"/>
+          <a:chOff x="0" y="0"/>
+          <a:chExt cx="0" cy="0"/>
+        </a:xfrm>
+      </p:grpSpPr>
+      <p:sp>
+        <p:nvSpPr>
+          <p:cNvPr id="6" name="TextBox 5">
+            <a:extLst>
+              <a:ext uri="{FF2B5EF4-FFF2-40B4-BE49-F238E27FC236}">
+                <a16:creationId xmlns:a16="http://schemas.microsoft.com/office/drawing/2014/main" id="{002038A8-B144-43A7-A8F7-51A6EE9099D3}"/>
+              </a:ext>
+            </a:extLst>
+          </p:cNvPr>
+          <p:cNvSpPr txBox="1"/>
+          <p:nvPr/>
+        </p:nvSpPr>
+        <p:spPr>
+          <a:xfrm>
+            <a:off x="226502" y="260059"/>
+            <a:ext cx="9102055" cy="5262979"/>
+          </a:xfrm>
+          <a:prstGeom prst="rect">
+            <a:avLst/>
+          </a:prstGeom>
+          <a:noFill/>
+        </p:spPr>
+        <p:txBody>
+          <a:bodyPr wrap="square" rtlCol="0">
+            <a:spAutoFit/>
+          </a:bodyPr>
+          <a:lstStyle/>
+          <a:p>
+            <a:r>
+              <a:rPr lang="en-GB" sz="1200" dirty="0" err="1"/>
+              <a:t>set.seed</a:t>
+            </a:r>
+            <a:r>
+              <a:rPr lang="en-GB" sz="1200" dirty="0"/>
+              <a:t>(533)</a:t>
+            </a:r>
+          </a:p>
+          <a:p>
+            <a:r>
+              <a:rPr lang="en-GB" sz="1200" dirty="0" err="1"/>
+              <a:t>makeitems</a:t>
+            </a:r>
+            <a:r>
+              <a:rPr lang="en-GB" sz="1200" dirty="0"/>
+              <a:t> &lt;- function(){</a:t>
+            </a:r>
+          </a:p>
+          <a:p>
+            <a:r>
+              <a:rPr lang="en-GB" sz="1200" dirty="0"/>
+              <a:t>  S = </a:t>
+            </a:r>
+            <a:r>
+              <a:rPr lang="en-GB" sz="1200" dirty="0" err="1"/>
+              <a:t>runif</a:t>
+            </a:r>
+            <a:r>
+              <a:rPr lang="en-GB" sz="1200" dirty="0"/>
+              <a:t>(5,.4,2)</a:t>
+            </a:r>
+          </a:p>
+          <a:p>
+            <a:r>
+              <a:rPr lang="en-GB" sz="1200" dirty="0"/>
+              <a:t>  f = </a:t>
+            </a:r>
+            <a:r>
+              <a:rPr lang="en-GB" sz="1200" dirty="0" err="1"/>
+              <a:t>runif</a:t>
+            </a:r>
+            <a:r>
+              <a:rPr lang="en-GB" sz="1200" dirty="0"/>
+              <a:t>(5,.4,.99)</a:t>
+            </a:r>
+          </a:p>
+          <a:p>
+            <a:r>
+              <a:rPr lang="en-GB" sz="1200" dirty="0"/>
+              <a:t>  R = f %*% t(f)</a:t>
+            </a:r>
+          </a:p>
+          <a:p>
+            <a:r>
+              <a:rPr lang="en-GB" sz="1200" dirty="0"/>
+              <a:t>  </a:t>
+            </a:r>
+            <a:r>
+              <a:rPr lang="en-GB" sz="1200" dirty="0" err="1"/>
+              <a:t>diag</a:t>
+            </a:r>
+            <a:r>
+              <a:rPr lang="en-GB" sz="1200" dirty="0"/>
+              <a:t>(R) = 1</a:t>
+            </a:r>
+          </a:p>
+          <a:p>
+            <a:r>
+              <a:rPr lang="en-GB" sz="1200" dirty="0"/>
+              <a:t>  items = round(MASS::</a:t>
+            </a:r>
+            <a:r>
+              <a:rPr lang="en-GB" sz="1200" dirty="0" err="1"/>
+              <a:t>mvrnorm</a:t>
+            </a:r>
+            <a:r>
+              <a:rPr lang="en-GB" sz="1200" dirty="0"/>
+              <a:t>(400, mu = </a:t>
+            </a:r>
+            <a:r>
+              <a:rPr lang="en-GB" sz="1200" dirty="0" err="1"/>
+              <a:t>rnorm</a:t>
+            </a:r>
+            <a:r>
+              <a:rPr lang="en-GB" sz="1200" dirty="0"/>
+              <a:t>(5,3,.6), Sigma=</a:t>
+            </a:r>
+            <a:r>
+              <a:rPr lang="en-GB" sz="1200" dirty="0" err="1"/>
+              <a:t>diag</a:t>
+            </a:r>
+            <a:r>
+              <a:rPr lang="en-GB" sz="1200" dirty="0"/>
+              <a:t>(S)%*%R%*%</a:t>
+            </a:r>
+            <a:r>
+              <a:rPr lang="en-GB" sz="1200" dirty="0" err="1"/>
+              <a:t>diag</a:t>
+            </a:r>
+            <a:r>
+              <a:rPr lang="en-GB" sz="1200" dirty="0"/>
+              <a:t>(S)))</a:t>
+            </a:r>
+          </a:p>
+          <a:p>
+            <a:r>
+              <a:rPr lang="en-GB" sz="1200" dirty="0"/>
+              <a:t>  apply(items, 2, function(x) </a:t>
+            </a:r>
+            <a:r>
+              <a:rPr lang="en-GB" sz="1200" dirty="0" err="1"/>
+              <a:t>pmin</a:t>
+            </a:r>
+            <a:r>
+              <a:rPr lang="en-GB" sz="1200" dirty="0"/>
+              <a:t>(7,pmax(1,x)))</a:t>
+            </a:r>
+          </a:p>
+          <a:p>
+            <a:r>
+              <a:rPr lang="en-GB" sz="1200" dirty="0"/>
+              <a:t>}</a:t>
+            </a:r>
+          </a:p>
+          <a:p>
+            <a:r>
+              <a:rPr lang="en-GB" sz="1200" dirty="0" err="1"/>
+              <a:t>eg_data</a:t>
+            </a:r>
+            <a:r>
+              <a:rPr lang="en-GB" sz="1200" dirty="0"/>
+              <a:t> = </a:t>
+            </a:r>
+            <a:r>
+              <a:rPr lang="en-GB" sz="1200" dirty="0" err="1"/>
+              <a:t>do.call</a:t>
+            </a:r>
+            <a:r>
+              <a:rPr lang="en-GB" sz="1200" dirty="0"/>
+              <a:t>(</a:t>
+            </a:r>
+            <a:r>
+              <a:rPr lang="en-GB" sz="1200" dirty="0" err="1"/>
+              <a:t>cbind,lapply</a:t>
+            </a:r>
+            <a:r>
+              <a:rPr lang="en-GB" sz="1200" dirty="0"/>
+              <a:t>(1:2, function(x) </a:t>
+            </a:r>
+            <a:r>
+              <a:rPr lang="en-GB" sz="1200" dirty="0" err="1"/>
+              <a:t>makeitems</a:t>
+            </a:r>
+            <a:r>
+              <a:rPr lang="en-GB" sz="1200" dirty="0"/>
+              <a:t>()))</a:t>
+            </a:r>
+          </a:p>
+          <a:p>
+            <a:r>
+              <a:rPr lang="en-GB" sz="1200" dirty="0" err="1"/>
+              <a:t>eg_data</a:t>
+            </a:r>
+            <a:r>
+              <a:rPr lang="en-GB" sz="1200" dirty="0"/>
+              <a:t>[,5] &lt;- round(</a:t>
+            </a:r>
+            <a:r>
+              <a:rPr lang="en-GB" sz="1200" dirty="0" err="1"/>
+              <a:t>rowMeans</a:t>
+            </a:r>
+            <a:r>
+              <a:rPr lang="en-GB" sz="1200" dirty="0"/>
+              <a:t>(</a:t>
+            </a:r>
+            <a:r>
+              <a:rPr lang="en-GB" sz="1200" dirty="0" err="1"/>
+              <a:t>eg_data</a:t>
+            </a:r>
+            <a:r>
+              <a:rPr lang="en-GB" sz="1200" dirty="0"/>
+              <a:t>[,c(5,10)]))</a:t>
+            </a:r>
+          </a:p>
+          <a:p>
+            <a:r>
+              <a:rPr lang="en-GB" sz="1200" dirty="0" err="1"/>
+              <a:t>eg_data</a:t>
+            </a:r>
+            <a:r>
+              <a:rPr lang="en-GB" sz="1200" dirty="0"/>
+              <a:t> &lt;- </a:t>
+            </a:r>
+            <a:r>
+              <a:rPr lang="en-GB" sz="1200" dirty="0" err="1"/>
+              <a:t>eg_data</a:t>
+            </a:r>
+            <a:r>
+              <a:rPr lang="en-GB" sz="1200" dirty="0"/>
+              <a:t>[,-10]</a:t>
+            </a:r>
+          </a:p>
+          <a:p>
+            <a:r>
+              <a:rPr lang="en-GB" sz="1200" dirty="0" err="1"/>
+              <a:t>eg_data</a:t>
+            </a:r>
+            <a:r>
+              <a:rPr lang="en-GB" sz="1200" dirty="0"/>
+              <a:t>[,1] &lt;- max(</a:t>
+            </a:r>
+            <a:r>
+              <a:rPr lang="en-GB" sz="1200" dirty="0" err="1"/>
+              <a:t>eg_data</a:t>
+            </a:r>
+            <a:r>
+              <a:rPr lang="en-GB" sz="1200" dirty="0"/>
+              <a:t>[,1]) - </a:t>
+            </a:r>
+            <a:r>
+              <a:rPr lang="en-GB" sz="1200" dirty="0" err="1"/>
+              <a:t>eg_data</a:t>
+            </a:r>
+            <a:r>
+              <a:rPr lang="en-GB" sz="1200" dirty="0"/>
+              <a:t>[,1] + 1</a:t>
+            </a:r>
+          </a:p>
+          <a:p>
+            <a:r>
+              <a:rPr lang="en-GB" sz="1200" dirty="0" err="1"/>
+              <a:t>eg_data</a:t>
+            </a:r>
+            <a:r>
+              <a:rPr lang="en-GB" sz="1200" dirty="0"/>
+              <a:t>[,6] &lt;- max(</a:t>
+            </a:r>
+            <a:r>
+              <a:rPr lang="en-GB" sz="1200" dirty="0" err="1"/>
+              <a:t>eg_data</a:t>
+            </a:r>
+            <a:r>
+              <a:rPr lang="en-GB" sz="1200" dirty="0"/>
+              <a:t>[,6]) - </a:t>
+            </a:r>
+            <a:r>
+              <a:rPr lang="en-GB" sz="1200" dirty="0" err="1"/>
+              <a:t>eg_data</a:t>
+            </a:r>
+            <a:r>
+              <a:rPr lang="en-GB" sz="1200" dirty="0"/>
+              <a:t>[,6] + 1</a:t>
+            </a:r>
+          </a:p>
+          <a:p>
+            <a:r>
+              <a:rPr lang="en-GB" sz="1200" dirty="0" err="1"/>
+              <a:t>eg_data</a:t>
+            </a:r>
+            <a:r>
+              <a:rPr lang="en-GB" sz="1200" dirty="0"/>
+              <a:t> &lt;- </a:t>
+            </a:r>
+            <a:r>
+              <a:rPr lang="en-GB" sz="1200" dirty="0" err="1"/>
+              <a:t>as.data.frame</a:t>
+            </a:r>
+            <a:r>
+              <a:rPr lang="en-GB" sz="1200" dirty="0"/>
+              <a:t>(</a:t>
+            </a:r>
+            <a:r>
+              <a:rPr lang="en-GB" sz="1200" dirty="0" err="1"/>
+              <a:t>eg_data</a:t>
+            </a:r>
+            <a:r>
+              <a:rPr lang="en-GB" sz="1200" dirty="0"/>
+              <a:t>)</a:t>
+            </a:r>
+          </a:p>
+          <a:p>
+            <a:r>
+              <a:rPr lang="en-GB" sz="1200" dirty="0"/>
+              <a:t>names(</a:t>
+            </a:r>
+            <a:r>
+              <a:rPr lang="en-GB" sz="1200" dirty="0" err="1"/>
+              <a:t>eg_data</a:t>
+            </a:r>
+            <a:r>
+              <a:rPr lang="en-GB" sz="1200" dirty="0"/>
+              <a:t>) &lt;- paste0("item_",1:9)</a:t>
+            </a:r>
+          </a:p>
+          <a:p>
+            <a:endParaRPr lang="en-GB" sz="1200" dirty="0"/>
+          </a:p>
+          <a:p>
+            <a:endParaRPr lang="en-GB" sz="1200" dirty="0"/>
+          </a:p>
+          <a:p>
+            <a:r>
+              <a:rPr lang="en-GB" sz="1200" dirty="0"/>
+              <a:t>mm = fa(</a:t>
+            </a:r>
+            <a:r>
+              <a:rPr lang="en-GB" sz="1200" dirty="0" err="1"/>
+              <a:t>eg_data</a:t>
+            </a:r>
+            <a:r>
+              <a:rPr lang="en-GB" sz="1200" dirty="0"/>
+              <a:t>, </a:t>
+            </a:r>
+            <a:r>
+              <a:rPr lang="en-GB" sz="1200" dirty="0" err="1"/>
+              <a:t>nfactors</a:t>
+            </a:r>
+            <a:r>
+              <a:rPr lang="en-GB" sz="1200" dirty="0"/>
+              <a:t>=2, rotate = "</a:t>
+            </a:r>
+            <a:r>
+              <a:rPr lang="en-GB" sz="1200" dirty="0" err="1"/>
+              <a:t>oblimin</a:t>
+            </a:r>
+            <a:r>
+              <a:rPr lang="en-GB" sz="1200" dirty="0"/>
+              <a:t>", </a:t>
+            </a:r>
+            <a:r>
+              <a:rPr lang="en-GB" sz="1200" dirty="0" err="1"/>
+              <a:t>fm</a:t>
+            </a:r>
+            <a:r>
+              <a:rPr lang="en-GB" sz="1200" dirty="0"/>
+              <a:t>="ml")</a:t>
+            </a:r>
+          </a:p>
+          <a:p>
+            <a:r>
+              <a:rPr lang="en-GB" sz="1200" dirty="0"/>
+              <a:t>mm</a:t>
+            </a:r>
+          </a:p>
+          <a:p>
+            <a:endParaRPr lang="en-GB" sz="1200" dirty="0"/>
+          </a:p>
+          <a:p>
+            <a:r>
+              <a:rPr lang="en-GB" sz="1200" dirty="0"/>
+              <a:t># </a:t>
+            </a:r>
+            <a:r>
+              <a:rPr lang="en-GB" sz="1200" dirty="0" err="1"/>
+              <a:t>tli</a:t>
+            </a:r>
+            <a:endParaRPr lang="en-GB" sz="1200" dirty="0"/>
+          </a:p>
+          <a:p>
+            <a:r>
+              <a:rPr lang="en-GB" sz="1200" dirty="0"/>
+              <a:t>((1138.13/36) - (20.71/19)) / </a:t>
+            </a:r>
+          </a:p>
+          <a:p>
+            <a:r>
+              <a:rPr lang="en-GB" sz="1200" dirty="0"/>
+              <a:t>  ((1138.13/36) - 1)</a:t>
+            </a:r>
+          </a:p>
+          <a:p>
+            <a:endParaRPr lang="en-GB" sz="1200" dirty="0"/>
+          </a:p>
+          <a:p>
+            <a:r>
+              <a:rPr lang="en-GB" sz="1200" dirty="0"/>
+              <a:t># </a:t>
+            </a:r>
+            <a:r>
+              <a:rPr lang="en-GB" sz="1200" dirty="0" err="1"/>
+              <a:t>rmsea</a:t>
+            </a:r>
+            <a:endParaRPr lang="en-GB" sz="1200" dirty="0"/>
+          </a:p>
+          <a:p>
+            <a:r>
+              <a:rPr lang="en-GB" sz="1200" dirty="0"/>
+              <a:t>sqrt(20.71 - 19) / </a:t>
+            </a:r>
+          </a:p>
+          <a:p>
+            <a:r>
+              <a:rPr lang="en-GB" sz="1200" dirty="0"/>
+              <a:t>  sqrt(19*(400-1))</a:t>
+            </a:r>
+          </a:p>
+        </p:txBody>
+      </p:sp>
+    </p:spTree>
+    <p:extLst>
+      <p:ext uri="{BB962C8B-B14F-4D97-AF65-F5344CB8AC3E}">
+        <p14:creationId xmlns:p14="http://schemas.microsoft.com/office/powerpoint/2010/main" val="3463541842"/>
+      </p:ext>
+    </p:extLst>
+  </p:cSld>
+  <p:clrMapOvr>
+    <a:masterClrMapping/>
+  </p:clrMapOvr>
+</p:sld>
+</file>
+
 <file path=ppt/slides/slide2.xml><?xml version="1.0" encoding="utf-8"?>
 <p:sld xmlns:a="http://schemas.openxmlformats.org/drawingml/2006/main" xmlns:r="http://schemas.openxmlformats.org/officeDocument/2006/relationships" xmlns:p="http://schemas.openxmlformats.org/presentationml/2006/main">
   <p:cSld>

</xml_diff>